<commit_message>
Improve clipboard slide dimensions to fit content instead of using fixed size
- Enhanced PowerPointNormalizer to calculate content bounds for clipboard format
- Added calculateContentBounds() function that analyzes all elements to determine optimal slide size
- Calculates min/max coordinates across all text, shapes, and images
- Adds 10% padding around content with minimum 50px buffer
- Ensures minimum dimensions of 400x300 for usability
- Replaces hardcoded 960x720 default that was causing content clipping
- Fixed TypeScript errors by removing unused functions in App.tsx
- Console logging added for debugging dimension calculations

🤖 Generated with [Claude Code](https://claude.ai/code)

Co-Authored-By: Claude <noreply@anthropic.com>
</commit_message>
<xml_diff>
--- a/packages/ppt-paste-server/test/test-harness/fixtures/presentation2.pptx
+++ b/packages/ppt-paste-server/test/test-harness/fixtures/presentation2.pptx
@@ -5,17 +5,18 @@
     <p:sldMasterId id="2147483648" r:id="rId1"/>
   </p:sldMasterIdLst>
   <p:notesMasterIdLst>
-    <p:notesMasterId r:id="rId10"/>
+    <p:notesMasterId r:id="rId11"/>
   </p:notesMasterIdLst>
   <p:sldIdLst>
     <p:sldId id="324" r:id="rId2"/>
     <p:sldId id="290" r:id="rId3"/>
-    <p:sldId id="291" r:id="rId4"/>
-    <p:sldId id="279" r:id="rId5"/>
-    <p:sldId id="292" r:id="rId6"/>
-    <p:sldId id="295" r:id="rId7"/>
-    <p:sldId id="332" r:id="rId8"/>
-    <p:sldId id="310" r:id="rId9"/>
+    <p:sldId id="258" r:id="rId4"/>
+    <p:sldId id="291" r:id="rId5"/>
+    <p:sldId id="279" r:id="rId6"/>
+    <p:sldId id="292" r:id="rId7"/>
+    <p:sldId id="295" r:id="rId8"/>
+    <p:sldId id="332" r:id="rId9"/>
+    <p:sldId id="310" r:id="rId10"/>
   </p:sldIdLst>
   <p:sldSz cx="12192000" cy="6858000"/>
   <p:notesSz cx="6858000" cy="9144000"/>
@@ -204,7 +205,7 @@
           <a:p>
             <a:fld id="{5E9D7BE6-CD94-8A4D-94DE-12C56FB9D096}" type="datetimeFigureOut">
               <a:rPr lang="en-GB" smtClean="0"/>
-              <a:t>01/09/2025</a:t>
+              <a:t>02/09/2025</a:t>
             </a:fld>
             <a:endParaRPr lang="en-GB"/>
           </a:p>
@@ -809,7 +810,7 @@
           <a:p>
             <a:fld id="{00261774-8B75-4E74-962C-1DC0D1DF166E}" type="slidenum">
               <a:rPr lang="en-NL" smtClean="0"/>
-              <a:t>3</a:t>
+              <a:t>4</a:t>
             </a:fld>
             <a:endParaRPr lang="en-NL"/>
           </a:p>
@@ -898,7 +899,7 @@
           <a:p>
             <a:fld id="{86387322-DF05-4001-A552-6EE4DAB21027}" type="slidenum">
               <a:rPr lang="en-GB" smtClean="0"/>
-              <a:t>4</a:t>
+              <a:t>5</a:t>
             </a:fld>
             <a:endParaRPr lang="en-GB"/>
           </a:p>
@@ -1016,7 +1017,7 @@
           <a:p>
             <a:fld id="{00261774-8B75-4E74-962C-1DC0D1DF166E}" type="slidenum">
               <a:rPr lang="en-NL" smtClean="0"/>
-              <a:t>5</a:t>
+              <a:t>6</a:t>
             </a:fld>
             <a:endParaRPr lang="en-NL"/>
           </a:p>
@@ -1100,7 +1101,7 @@
           <a:p>
             <a:fld id="{00261774-8B75-4E74-962C-1DC0D1DF166E}" type="slidenum">
               <a:rPr lang="en-NL" smtClean="0"/>
-              <a:t>6</a:t>
+              <a:t>7</a:t>
             </a:fld>
             <a:endParaRPr lang="en-NL"/>
           </a:p>
@@ -1266,7 +1267,7 @@
           <a:p>
             <a:fld id="{C216026F-EBB9-B044-ABC6-C0D1083D5348}" type="datetimeFigureOut">
               <a:rPr lang="en-GB" smtClean="0"/>
-              <a:t>01/09/2025</a:t>
+              <a:t>02/09/2025</a:t>
             </a:fld>
             <a:endParaRPr lang="en-GB"/>
           </a:p>
@@ -1464,7 +1465,7 @@
           <a:p>
             <a:fld id="{C216026F-EBB9-B044-ABC6-C0D1083D5348}" type="datetimeFigureOut">
               <a:rPr lang="en-GB" smtClean="0"/>
-              <a:t>01/09/2025</a:t>
+              <a:t>02/09/2025</a:t>
             </a:fld>
             <a:endParaRPr lang="en-GB"/>
           </a:p>
@@ -1672,7 +1673,7 @@
           <a:p>
             <a:fld id="{C216026F-EBB9-B044-ABC6-C0D1083D5348}" type="datetimeFigureOut">
               <a:rPr lang="en-GB" smtClean="0"/>
-              <a:t>01/09/2025</a:t>
+              <a:t>02/09/2025</a:t>
             </a:fld>
             <a:endParaRPr lang="en-GB"/>
           </a:p>
@@ -2597,7 +2598,7 @@
           <a:p>
             <a:fld id="{C216026F-EBB9-B044-ABC6-C0D1083D5348}" type="datetimeFigureOut">
               <a:rPr lang="en-GB" smtClean="0"/>
-              <a:t>01/09/2025</a:t>
+              <a:t>02/09/2025</a:t>
             </a:fld>
             <a:endParaRPr lang="en-GB"/>
           </a:p>
@@ -2872,7 +2873,7 @@
           <a:p>
             <a:fld id="{C216026F-EBB9-B044-ABC6-C0D1083D5348}" type="datetimeFigureOut">
               <a:rPr lang="en-GB" smtClean="0"/>
-              <a:t>01/09/2025</a:t>
+              <a:t>02/09/2025</a:t>
             </a:fld>
             <a:endParaRPr lang="en-GB"/>
           </a:p>
@@ -3137,7 +3138,7 @@
           <a:p>
             <a:fld id="{C216026F-EBB9-B044-ABC6-C0D1083D5348}" type="datetimeFigureOut">
               <a:rPr lang="en-GB" smtClean="0"/>
-              <a:t>01/09/2025</a:t>
+              <a:t>02/09/2025</a:t>
             </a:fld>
             <a:endParaRPr lang="en-GB"/>
           </a:p>
@@ -3549,7 +3550,7 @@
           <a:p>
             <a:fld id="{C216026F-EBB9-B044-ABC6-C0D1083D5348}" type="datetimeFigureOut">
               <a:rPr lang="en-GB" smtClean="0"/>
-              <a:t>01/09/2025</a:t>
+              <a:t>02/09/2025</a:t>
             </a:fld>
             <a:endParaRPr lang="en-GB"/>
           </a:p>
@@ -3690,7 +3691,7 @@
           <a:p>
             <a:fld id="{C216026F-EBB9-B044-ABC6-C0D1083D5348}" type="datetimeFigureOut">
               <a:rPr lang="en-GB" smtClean="0"/>
-              <a:t>01/09/2025</a:t>
+              <a:t>02/09/2025</a:t>
             </a:fld>
             <a:endParaRPr lang="en-GB"/>
           </a:p>
@@ -3803,7 +3804,7 @@
           <a:p>
             <a:fld id="{C216026F-EBB9-B044-ABC6-C0D1083D5348}" type="datetimeFigureOut">
               <a:rPr lang="en-GB" smtClean="0"/>
-              <a:t>01/09/2025</a:t>
+              <a:t>02/09/2025</a:t>
             </a:fld>
             <a:endParaRPr lang="en-GB"/>
           </a:p>
@@ -4114,7 +4115,7 @@
           <a:p>
             <a:fld id="{C216026F-EBB9-B044-ABC6-C0D1083D5348}" type="datetimeFigureOut">
               <a:rPr lang="en-GB" smtClean="0"/>
-              <a:t>01/09/2025</a:t>
+              <a:t>02/09/2025</a:t>
             </a:fld>
             <a:endParaRPr lang="en-GB"/>
           </a:p>
@@ -4402,7 +4403,7 @@
           <a:p>
             <a:fld id="{C216026F-EBB9-B044-ABC6-C0D1083D5348}" type="datetimeFigureOut">
               <a:rPr lang="en-GB" smtClean="0"/>
-              <a:t>01/09/2025</a:t>
+              <a:t>02/09/2025</a:t>
             </a:fld>
             <a:endParaRPr lang="en-GB"/>
           </a:p>
@@ -4643,7 +4644,7 @@
           <a:p>
             <a:fld id="{C216026F-EBB9-B044-ABC6-C0D1083D5348}" type="datetimeFigureOut">
               <a:rPr lang="en-GB" smtClean="0"/>
-              <a:t>01/09/2025</a:t>
+              <a:t>02/09/2025</a:t>
             </a:fld>
             <a:endParaRPr lang="en-GB"/>
           </a:p>
@@ -5828,6 +5829,398 @@
 </file>
 
 <file path=ppt/slides/slide3.xml><?xml version="1.0" encoding="utf-8"?>
+<p:sld xmlns:a="http://schemas.openxmlformats.org/drawingml/2006/main" xmlns:r="http://schemas.openxmlformats.org/officeDocument/2006/relationships" xmlns:p="http://schemas.openxmlformats.org/presentationml/2006/main">
+  <p:cSld>
+    <p:spTree>
+      <p:nvGrpSpPr>
+        <p:cNvPr id="1" name=""/>
+        <p:cNvGrpSpPr/>
+        <p:nvPr/>
+      </p:nvGrpSpPr>
+      <p:grpSpPr>
+        <a:xfrm>
+          <a:off x="0" y="0"/>
+          <a:ext cx="0" cy="0"/>
+          <a:chOff x="0" y="0"/>
+          <a:chExt cx="0" cy="0"/>
+        </a:xfrm>
+      </p:grpSpPr>
+      <p:sp>
+        <p:nvSpPr>
+          <p:cNvPr id="2" name="Title 1">
+            <a:extLst>
+              <a:ext uri="{FF2B5EF4-FFF2-40B4-BE49-F238E27FC236}">
+                <a16:creationId xmlns:a16="http://schemas.microsoft.com/office/drawing/2014/main" id="{47A22431-10EB-7D90-1C42-DC2EDB3A23C2}"/>
+              </a:ext>
+            </a:extLst>
+          </p:cNvPr>
+          <p:cNvSpPr>
+            <a:spLocks noGrp="1"/>
+          </p:cNvSpPr>
+          <p:nvPr>
+            <p:ph type="title"/>
+          </p:nvPr>
+        </p:nvSpPr>
+        <p:spPr/>
+        <p:txBody>
+          <a:bodyPr/>
+          <a:lstStyle/>
+          <a:p>
+            <a:r>
+              <a:rPr lang="en-GB" dirty="0"/>
+              <a:t>Table</a:t>
+            </a:r>
+          </a:p>
+        </p:txBody>
+      </p:sp>
+      <p:graphicFrame>
+        <p:nvGraphicFramePr>
+          <p:cNvPr id="4" name="Content Placeholder 3">
+            <a:extLst>
+              <a:ext uri="{FF2B5EF4-FFF2-40B4-BE49-F238E27FC236}">
+                <a16:creationId xmlns:a16="http://schemas.microsoft.com/office/drawing/2014/main" id="{6084CB9C-95A6-8B70-BF31-11CE82C5DF6B}"/>
+              </a:ext>
+            </a:extLst>
+          </p:cNvPr>
+          <p:cNvGraphicFramePr>
+            <a:graphicFrameLocks noGrp="1"/>
+          </p:cNvGraphicFramePr>
+          <p:nvPr>
+            <p:ph idx="1"/>
+          </p:nvPr>
+        </p:nvGraphicFramePr>
+        <p:xfrm>
+          <a:off x="838200" y="1825625"/>
+          <a:ext cx="10515600" cy="1483360"/>
+        </p:xfrm>
+        <a:graphic>
+          <a:graphicData uri="http://schemas.openxmlformats.org/drawingml/2006/table">
+            <a:tbl>
+              <a:tblPr firstRow="1" bandRow="1">
+                <a:tableStyleId>{5C22544A-7EE6-4342-B048-85BDC9FD1C3A}</a:tableStyleId>
+              </a:tblPr>
+              <a:tblGrid>
+                <a:gridCol w="2103120">
+                  <a:extLst>
+                    <a:ext uri="{9D8B030D-6E8A-4147-A177-3AD203B41FA5}">
+                      <a16:colId xmlns:a16="http://schemas.microsoft.com/office/drawing/2014/main" val="1783473254"/>
+                    </a:ext>
+                  </a:extLst>
+                </a:gridCol>
+                <a:gridCol w="2103120">
+                  <a:extLst>
+                    <a:ext uri="{9D8B030D-6E8A-4147-A177-3AD203B41FA5}">
+                      <a16:colId xmlns:a16="http://schemas.microsoft.com/office/drawing/2014/main" val="3771208"/>
+                    </a:ext>
+                  </a:extLst>
+                </a:gridCol>
+                <a:gridCol w="2103120">
+                  <a:extLst>
+                    <a:ext uri="{9D8B030D-6E8A-4147-A177-3AD203B41FA5}">
+                      <a16:colId xmlns:a16="http://schemas.microsoft.com/office/drawing/2014/main" val="52912583"/>
+                    </a:ext>
+                  </a:extLst>
+                </a:gridCol>
+                <a:gridCol w="2103120">
+                  <a:extLst>
+                    <a:ext uri="{9D8B030D-6E8A-4147-A177-3AD203B41FA5}">
+                      <a16:colId xmlns:a16="http://schemas.microsoft.com/office/drawing/2014/main" val="3417633426"/>
+                    </a:ext>
+                  </a:extLst>
+                </a:gridCol>
+                <a:gridCol w="2103120">
+                  <a:extLst>
+                    <a:ext uri="{9D8B030D-6E8A-4147-A177-3AD203B41FA5}">
+                      <a16:colId xmlns:a16="http://schemas.microsoft.com/office/drawing/2014/main" val="3798907211"/>
+                    </a:ext>
+                  </a:extLst>
+                </a:gridCol>
+              </a:tblGrid>
+              <a:tr h="370840">
+                <a:tc>
+                  <a:txBody>
+                    <a:bodyPr/>
+                    <a:lstStyle/>
+                    <a:p>
+                      <a:r>
+                        <a:rPr lang="en-GB" dirty="0"/>
+                        <a:t>A</a:t>
+                      </a:r>
+                    </a:p>
+                  </a:txBody>
+                  <a:tcPr/>
+                </a:tc>
+                <a:tc>
+                  <a:txBody>
+                    <a:bodyPr/>
+                    <a:lstStyle/>
+                    <a:p>
+                      <a:endParaRPr lang="en-GB"/>
+                    </a:p>
+                  </a:txBody>
+                  <a:tcPr/>
+                </a:tc>
+                <a:tc>
+                  <a:txBody>
+                    <a:bodyPr/>
+                    <a:lstStyle/>
+                    <a:p>
+                      <a:r>
+                        <a:rPr lang="en-GB" dirty="0" err="1"/>
+                        <a:t>asc</a:t>
+                      </a:r>
+                      <a:endParaRPr lang="en-GB" dirty="0"/>
+                    </a:p>
+                  </a:txBody>
+                  <a:tcPr/>
+                </a:tc>
+                <a:tc>
+                  <a:txBody>
+                    <a:bodyPr/>
+                    <a:lstStyle/>
+                    <a:p>
+                      <a:r>
+                        <a:rPr lang="en-GB" dirty="0" err="1"/>
+                        <a:t>ascasc</a:t>
+                      </a:r>
+                      <a:endParaRPr lang="en-GB" dirty="0"/>
+                    </a:p>
+                  </a:txBody>
+                  <a:tcPr/>
+                </a:tc>
+                <a:tc>
+                  <a:txBody>
+                    <a:bodyPr/>
+                    <a:lstStyle/>
+                    <a:p>
+                      <a:endParaRPr lang="en-GB"/>
+                    </a:p>
+                  </a:txBody>
+                  <a:tcPr/>
+                </a:tc>
+                <a:extLst>
+                  <a:ext uri="{0D108BD9-81ED-4DB2-BD59-A6C34878D82A}">
+                    <a16:rowId xmlns:a16="http://schemas.microsoft.com/office/drawing/2014/main" val="1612746136"/>
+                  </a:ext>
+                </a:extLst>
+              </a:tr>
+              <a:tr h="370840">
+                <a:tc>
+                  <a:txBody>
+                    <a:bodyPr/>
+                    <a:lstStyle/>
+                    <a:p>
+                      <a:endParaRPr lang="en-GB"/>
+                    </a:p>
+                  </a:txBody>
+                  <a:tcPr/>
+                </a:tc>
+                <a:tc>
+                  <a:txBody>
+                    <a:bodyPr/>
+                    <a:lstStyle/>
+                    <a:p>
+                      <a:r>
+                        <a:rPr lang="en-GB" dirty="0" err="1"/>
+                        <a:t>asc</a:t>
+                      </a:r>
+                      <a:endParaRPr lang="en-GB" dirty="0"/>
+                    </a:p>
+                  </a:txBody>
+                  <a:tcPr/>
+                </a:tc>
+                <a:tc>
+                  <a:txBody>
+                    <a:bodyPr/>
+                    <a:lstStyle/>
+                    <a:p>
+                      <a:r>
+                        <a:rPr lang="en-GB" dirty="0" err="1"/>
+                        <a:t>asc</a:t>
+                      </a:r>
+                      <a:endParaRPr lang="en-GB" dirty="0"/>
+                    </a:p>
+                  </a:txBody>
+                  <a:tcPr/>
+                </a:tc>
+                <a:tc>
+                  <a:txBody>
+                    <a:bodyPr/>
+                    <a:lstStyle/>
+                    <a:p>
+                      <a:endParaRPr lang="en-GB"/>
+                    </a:p>
+                  </a:txBody>
+                  <a:tcPr/>
+                </a:tc>
+                <a:tc>
+                  <a:txBody>
+                    <a:bodyPr/>
+                    <a:lstStyle/>
+                    <a:p>
+                      <a:endParaRPr lang="en-GB"/>
+                    </a:p>
+                  </a:txBody>
+                  <a:tcPr/>
+                </a:tc>
+                <a:extLst>
+                  <a:ext uri="{0D108BD9-81ED-4DB2-BD59-A6C34878D82A}">
+                    <a16:rowId xmlns:a16="http://schemas.microsoft.com/office/drawing/2014/main" val="2730122503"/>
+                  </a:ext>
+                </a:extLst>
+              </a:tr>
+              <a:tr h="370840">
+                <a:tc>
+                  <a:txBody>
+                    <a:bodyPr/>
+                    <a:lstStyle/>
+                    <a:p>
+                      <a:endParaRPr lang="en-GB"/>
+                    </a:p>
+                  </a:txBody>
+                  <a:tcPr/>
+                </a:tc>
+                <a:tc>
+                  <a:txBody>
+                    <a:bodyPr/>
+                    <a:lstStyle/>
+                    <a:p>
+                      <a:r>
+                        <a:rPr lang="en-GB" dirty="0" err="1"/>
+                        <a:t>asc</a:t>
+                      </a:r>
+                      <a:endParaRPr lang="en-GB" dirty="0"/>
+                    </a:p>
+                  </a:txBody>
+                  <a:tcPr/>
+                </a:tc>
+                <a:tc>
+                  <a:txBody>
+                    <a:bodyPr/>
+                    <a:lstStyle/>
+                    <a:p>
+                      <a:r>
+                        <a:rPr lang="en-GB" dirty="0" err="1"/>
+                        <a:t>asc</a:t>
+                      </a:r>
+                      <a:endParaRPr lang="en-GB" dirty="0"/>
+                    </a:p>
+                  </a:txBody>
+                  <a:tcPr/>
+                </a:tc>
+                <a:tc>
+                  <a:txBody>
+                    <a:bodyPr/>
+                    <a:lstStyle/>
+                    <a:p>
+                      <a:r>
+                        <a:rPr lang="en-GB" dirty="0" err="1"/>
+                        <a:t>asc</a:t>
+                      </a:r>
+                      <a:endParaRPr lang="en-GB" dirty="0"/>
+                    </a:p>
+                  </a:txBody>
+                  <a:tcPr/>
+                </a:tc>
+                <a:tc>
+                  <a:txBody>
+                    <a:bodyPr/>
+                    <a:lstStyle/>
+                    <a:p>
+                      <a:r>
+                        <a:rPr lang="en-GB" dirty="0" err="1"/>
+                        <a:t>acsac</a:t>
+                      </a:r>
+                      <a:endParaRPr lang="en-GB" dirty="0"/>
+                    </a:p>
+                  </a:txBody>
+                  <a:tcPr/>
+                </a:tc>
+                <a:extLst>
+                  <a:ext uri="{0D108BD9-81ED-4DB2-BD59-A6C34878D82A}">
+                    <a16:rowId xmlns:a16="http://schemas.microsoft.com/office/drawing/2014/main" val="1039753366"/>
+                  </a:ext>
+                </a:extLst>
+              </a:tr>
+              <a:tr h="370840">
+                <a:tc>
+                  <a:txBody>
+                    <a:bodyPr/>
+                    <a:lstStyle/>
+                    <a:p>
+                      <a:endParaRPr lang="en-GB"/>
+                    </a:p>
+                  </a:txBody>
+                  <a:tcPr/>
+                </a:tc>
+                <a:tc>
+                  <a:txBody>
+                    <a:bodyPr/>
+                    <a:lstStyle/>
+                    <a:p>
+                      <a:endParaRPr lang="en-GB"/>
+                    </a:p>
+                  </a:txBody>
+                  <a:tcPr/>
+                </a:tc>
+                <a:tc>
+                  <a:txBody>
+                    <a:bodyPr/>
+                    <a:lstStyle/>
+                    <a:p>
+                      <a:endParaRPr lang="en-GB"/>
+                    </a:p>
+                  </a:txBody>
+                  <a:tcPr/>
+                </a:tc>
+                <a:tc>
+                  <a:txBody>
+                    <a:bodyPr/>
+                    <a:lstStyle/>
+                    <a:p>
+                      <a:r>
+                        <a:rPr lang="en-GB" dirty="0" err="1"/>
+                        <a:t>asc</a:t>
+                      </a:r>
+                      <a:endParaRPr lang="en-GB" dirty="0"/>
+                    </a:p>
+                  </a:txBody>
+                  <a:tcPr/>
+                </a:tc>
+                <a:tc>
+                  <a:txBody>
+                    <a:bodyPr/>
+                    <a:lstStyle/>
+                    <a:p>
+                      <a:endParaRPr lang="en-GB" dirty="0"/>
+                    </a:p>
+                  </a:txBody>
+                  <a:tcPr/>
+                </a:tc>
+                <a:extLst>
+                  <a:ext uri="{0D108BD9-81ED-4DB2-BD59-A6C34878D82A}">
+                    <a16:rowId xmlns:a16="http://schemas.microsoft.com/office/drawing/2014/main" val="2594516520"/>
+                  </a:ext>
+                </a:extLst>
+              </a:tr>
+            </a:tbl>
+          </a:graphicData>
+        </a:graphic>
+      </p:graphicFrame>
+    </p:spTree>
+    <p:extLst>
+      <p:ext uri="{BB962C8B-B14F-4D97-AF65-F5344CB8AC3E}">
+        <p14:creationId xmlns:p14="http://schemas.microsoft.com/office/powerpoint/2010/main" val="3596990724"/>
+      </p:ext>
+    </p:extLst>
+  </p:cSld>
+  <p:clrMapOvr>
+    <a:masterClrMapping/>
+  </p:clrMapOvr>
+</p:sld>
+</file>
+
+<file path=ppt/slides/slide4.xml><?xml version="1.0" encoding="utf-8"?>
 <p:sld xmlns:a="http://schemas.openxmlformats.org/drawingml/2006/main" xmlns:r="http://schemas.openxmlformats.org/officeDocument/2006/relationships" xmlns:p="http://schemas.openxmlformats.org/presentationml/2006/main">
   <p:cSld>
     <p:spTree>
@@ -7165,216 +7558,6 @@
 </p:sld>
 </file>
 
-<file path=ppt/slides/slide4.xml><?xml version="1.0" encoding="utf-8"?>
-<p:sld xmlns:a="http://schemas.openxmlformats.org/drawingml/2006/main" xmlns:r="http://schemas.openxmlformats.org/officeDocument/2006/relationships" xmlns:p="http://schemas.openxmlformats.org/presentationml/2006/main">
-  <p:cSld>
-    <p:spTree>
-      <p:nvGrpSpPr>
-        <p:cNvPr id="1" name=""/>
-        <p:cNvGrpSpPr/>
-        <p:nvPr/>
-      </p:nvGrpSpPr>
-      <p:grpSpPr>
-        <a:xfrm>
-          <a:off x="0" y="0"/>
-          <a:ext cx="0" cy="0"/>
-          <a:chOff x="0" y="0"/>
-          <a:chExt cx="0" cy="0"/>
-        </a:xfrm>
-      </p:grpSpPr>
-      <p:sp>
-        <p:nvSpPr>
-          <p:cNvPr id="2" name="TextBox 1">
-            <a:extLst>
-              <a:ext uri="{FF2B5EF4-FFF2-40B4-BE49-F238E27FC236}">
-                <a16:creationId xmlns:a16="http://schemas.microsoft.com/office/drawing/2014/main" id="{6BD4F877-08F7-A5BB-EA82-EDE06127F026}"/>
-              </a:ext>
-            </a:extLst>
-          </p:cNvPr>
-          <p:cNvSpPr txBox="1"/>
-          <p:nvPr/>
-        </p:nvSpPr>
-        <p:spPr>
-          <a:xfrm>
-            <a:off x="1009135" y="1720840"/>
-            <a:ext cx="10173730" cy="2308324"/>
-          </a:xfrm>
-          <a:prstGeom prst="rect">
-            <a:avLst/>
-          </a:prstGeom>
-          <a:noFill/>
-        </p:spPr>
-        <p:txBody>
-          <a:bodyPr wrap="square" lIns="91440" tIns="45720" rIns="91440" bIns="45720" rtlCol="0" anchor="t">
-            <a:spAutoFit/>
-          </a:bodyPr>
-          <a:lstStyle/>
-          <a:p>
-            <a:r>
-              <a:rPr lang="en-GB" sz="3600" b="1">
-                <a:solidFill>
-                  <a:schemeClr val="accent4"/>
-                </a:solidFill>
-              </a:rPr>
-              <a:t>User Centered Design </a:t>
-            </a:r>
-            <a:r>
-              <a:rPr lang="en-GB" sz="3600" b="1">
-                <a:solidFill>
-                  <a:schemeClr val="accent1"/>
-                </a:solidFill>
-              </a:rPr>
-              <a:t>refers</a:t>
-            </a:r>
-            <a:r>
-              <a:rPr lang="en-GB" sz="3600" b="1">
-                <a:solidFill>
-                  <a:schemeClr val="accent1"/>
-                </a:solidFill>
-                <a:effectLst/>
-              </a:rPr>
-              <a:t> to </a:t>
-            </a:r>
-            <a:r>
-              <a:rPr lang="en-GB" sz="3600" b="1">
-                <a:solidFill>
-                  <a:schemeClr val="accent1"/>
-                </a:solidFill>
-              </a:rPr>
-              <a:t>an </a:t>
-            </a:r>
-            <a:r>
-              <a:rPr lang="en-GB" sz="3600" b="1">
-                <a:solidFill>
-                  <a:schemeClr val="accent6"/>
-                </a:solidFill>
-              </a:rPr>
-              <a:t>iterative</a:t>
-            </a:r>
-            <a:r>
-              <a:rPr lang="en-GB" sz="3600" b="1">
-                <a:solidFill>
-                  <a:schemeClr val="accent1"/>
-                </a:solidFill>
-              </a:rPr>
-              <a:t> design process in which we focus on</a:t>
-            </a:r>
-            <a:r>
-              <a:rPr lang="en-GB" sz="3600" b="1">
-                <a:solidFill>
-                  <a:schemeClr val="accent1"/>
-                </a:solidFill>
-                <a:effectLst/>
-              </a:rPr>
-              <a:t> </a:t>
-            </a:r>
-            <a:r>
-              <a:rPr lang="en-GB" sz="3600" b="1">
-                <a:solidFill>
-                  <a:schemeClr val="accent3"/>
-                </a:solidFill>
-              </a:rPr>
-              <a:t>the</a:t>
-            </a:r>
-            <a:r>
-              <a:rPr lang="en-GB" sz="3600" b="1">
-                <a:solidFill>
-                  <a:schemeClr val="accent3"/>
-                </a:solidFill>
-                <a:effectLst/>
-              </a:rPr>
-              <a:t> </a:t>
-            </a:r>
-            <a:r>
-              <a:rPr lang="en-GB" sz="3600" b="1">
-                <a:solidFill>
-                  <a:schemeClr val="accent3"/>
-                </a:solidFill>
-              </a:rPr>
-              <a:t>users</a:t>
-            </a:r>
-            <a:r>
-              <a:rPr lang="en-GB" sz="3600" b="1">
-                <a:solidFill>
-                  <a:schemeClr val="accent1"/>
-                </a:solidFill>
-              </a:rPr>
-              <a:t> </a:t>
-            </a:r>
-            <a:r>
-              <a:rPr lang="en-GB" sz="3600" b="1">
-                <a:solidFill>
-                  <a:schemeClr val="accent3"/>
-                </a:solidFill>
-                <a:effectLst/>
-              </a:rPr>
-              <a:t>and</a:t>
-            </a:r>
-            <a:r>
-              <a:rPr lang="en-GB" sz="3600" b="1">
-                <a:solidFill>
-                  <a:schemeClr val="accent1"/>
-                </a:solidFill>
-                <a:effectLst/>
-              </a:rPr>
-              <a:t> </a:t>
-            </a:r>
-            <a:r>
-              <a:rPr lang="en-GB" sz="3600" b="1">
-                <a:solidFill>
-                  <a:schemeClr val="accent3"/>
-                </a:solidFill>
-              </a:rPr>
-              <a:t>their needs</a:t>
-            </a:r>
-            <a:r>
-              <a:rPr lang="en-GB" sz="3600" b="1">
-                <a:solidFill>
-                  <a:schemeClr val="accent2"/>
-                </a:solidFill>
-              </a:rPr>
-              <a:t> </a:t>
-            </a:r>
-            <a:r>
-              <a:rPr lang="en-GB" sz="3600" b="1">
-                <a:solidFill>
-                  <a:schemeClr val="accent1"/>
-                </a:solidFill>
-              </a:rPr>
-              <a:t>in </a:t>
-            </a:r>
-            <a:r>
-              <a:rPr lang="en-GB" sz="3600" b="1">
-                <a:solidFill>
-                  <a:schemeClr val="accent2"/>
-                </a:solidFill>
-              </a:rPr>
-              <a:t>each phase</a:t>
-            </a:r>
-            <a:r>
-              <a:rPr lang="en-GB" sz="3600" b="1">
-                <a:solidFill>
-                  <a:schemeClr val="accent1"/>
-                </a:solidFill>
-              </a:rPr>
-              <a:t> of the design and product development process</a:t>
-            </a:r>
-          </a:p>
-        </p:txBody>
-      </p:sp>
-    </p:spTree>
-    <p:extLst>
-      <p:ext uri="{BB962C8B-B14F-4D97-AF65-F5344CB8AC3E}">
-        <p14:creationId xmlns:p14="http://schemas.microsoft.com/office/powerpoint/2010/main" val="528717180"/>
-      </p:ext>
-    </p:extLst>
-  </p:cSld>
-  <p:clrMapOvr>
-    <a:masterClrMapping/>
-  </p:clrMapOvr>
-</p:sld>
-</file>
-
 <file path=ppt/slides/slide5.xml><?xml version="1.0" encoding="utf-8"?>
 <p:sld xmlns:a="http://schemas.openxmlformats.org/drawingml/2006/main" xmlns:r="http://schemas.openxmlformats.org/officeDocument/2006/relationships" xmlns:p="http://schemas.openxmlformats.org/presentationml/2006/main">
   <p:cSld>
@@ -7394,6 +7577,216 @@
       </p:grpSpPr>
       <p:sp>
         <p:nvSpPr>
+          <p:cNvPr id="2" name="TextBox 1">
+            <a:extLst>
+              <a:ext uri="{FF2B5EF4-FFF2-40B4-BE49-F238E27FC236}">
+                <a16:creationId xmlns:a16="http://schemas.microsoft.com/office/drawing/2014/main" id="{6BD4F877-08F7-A5BB-EA82-EDE06127F026}"/>
+              </a:ext>
+            </a:extLst>
+          </p:cNvPr>
+          <p:cNvSpPr txBox="1"/>
+          <p:nvPr/>
+        </p:nvSpPr>
+        <p:spPr>
+          <a:xfrm>
+            <a:off x="1009135" y="1720840"/>
+            <a:ext cx="10173730" cy="2308324"/>
+          </a:xfrm>
+          <a:prstGeom prst="rect">
+            <a:avLst/>
+          </a:prstGeom>
+          <a:noFill/>
+        </p:spPr>
+        <p:txBody>
+          <a:bodyPr wrap="square" lIns="91440" tIns="45720" rIns="91440" bIns="45720" rtlCol="0" anchor="t">
+            <a:spAutoFit/>
+          </a:bodyPr>
+          <a:lstStyle/>
+          <a:p>
+            <a:r>
+              <a:rPr lang="en-GB" sz="3600" b="1">
+                <a:solidFill>
+                  <a:schemeClr val="accent4"/>
+                </a:solidFill>
+              </a:rPr>
+              <a:t>User Centered Design </a:t>
+            </a:r>
+            <a:r>
+              <a:rPr lang="en-GB" sz="3600" b="1">
+                <a:solidFill>
+                  <a:schemeClr val="accent1"/>
+                </a:solidFill>
+              </a:rPr>
+              <a:t>refers</a:t>
+            </a:r>
+            <a:r>
+              <a:rPr lang="en-GB" sz="3600" b="1">
+                <a:solidFill>
+                  <a:schemeClr val="accent1"/>
+                </a:solidFill>
+                <a:effectLst/>
+              </a:rPr>
+              <a:t> to </a:t>
+            </a:r>
+            <a:r>
+              <a:rPr lang="en-GB" sz="3600" b="1">
+                <a:solidFill>
+                  <a:schemeClr val="accent1"/>
+                </a:solidFill>
+              </a:rPr>
+              <a:t>an </a:t>
+            </a:r>
+            <a:r>
+              <a:rPr lang="en-GB" sz="3600" b="1">
+                <a:solidFill>
+                  <a:schemeClr val="accent6"/>
+                </a:solidFill>
+              </a:rPr>
+              <a:t>iterative</a:t>
+            </a:r>
+            <a:r>
+              <a:rPr lang="en-GB" sz="3600" b="1">
+                <a:solidFill>
+                  <a:schemeClr val="accent1"/>
+                </a:solidFill>
+              </a:rPr>
+              <a:t> design process in which we focus on</a:t>
+            </a:r>
+            <a:r>
+              <a:rPr lang="en-GB" sz="3600" b="1">
+                <a:solidFill>
+                  <a:schemeClr val="accent1"/>
+                </a:solidFill>
+                <a:effectLst/>
+              </a:rPr>
+              <a:t> </a:t>
+            </a:r>
+            <a:r>
+              <a:rPr lang="en-GB" sz="3600" b="1">
+                <a:solidFill>
+                  <a:schemeClr val="accent3"/>
+                </a:solidFill>
+              </a:rPr>
+              <a:t>the</a:t>
+            </a:r>
+            <a:r>
+              <a:rPr lang="en-GB" sz="3600" b="1">
+                <a:solidFill>
+                  <a:schemeClr val="accent3"/>
+                </a:solidFill>
+                <a:effectLst/>
+              </a:rPr>
+              <a:t> </a:t>
+            </a:r>
+            <a:r>
+              <a:rPr lang="en-GB" sz="3600" b="1">
+                <a:solidFill>
+                  <a:schemeClr val="accent3"/>
+                </a:solidFill>
+              </a:rPr>
+              <a:t>users</a:t>
+            </a:r>
+            <a:r>
+              <a:rPr lang="en-GB" sz="3600" b="1">
+                <a:solidFill>
+                  <a:schemeClr val="accent1"/>
+                </a:solidFill>
+              </a:rPr>
+              <a:t> </a:t>
+            </a:r>
+            <a:r>
+              <a:rPr lang="en-GB" sz="3600" b="1">
+                <a:solidFill>
+                  <a:schemeClr val="accent3"/>
+                </a:solidFill>
+                <a:effectLst/>
+              </a:rPr>
+              <a:t>and</a:t>
+            </a:r>
+            <a:r>
+              <a:rPr lang="en-GB" sz="3600" b="1">
+                <a:solidFill>
+                  <a:schemeClr val="accent1"/>
+                </a:solidFill>
+                <a:effectLst/>
+              </a:rPr>
+              <a:t> </a:t>
+            </a:r>
+            <a:r>
+              <a:rPr lang="en-GB" sz="3600" b="1">
+                <a:solidFill>
+                  <a:schemeClr val="accent3"/>
+                </a:solidFill>
+              </a:rPr>
+              <a:t>their needs</a:t>
+            </a:r>
+            <a:r>
+              <a:rPr lang="en-GB" sz="3600" b="1">
+                <a:solidFill>
+                  <a:schemeClr val="accent2"/>
+                </a:solidFill>
+              </a:rPr>
+              <a:t> </a:t>
+            </a:r>
+            <a:r>
+              <a:rPr lang="en-GB" sz="3600" b="1">
+                <a:solidFill>
+                  <a:schemeClr val="accent1"/>
+                </a:solidFill>
+              </a:rPr>
+              <a:t>in </a:t>
+            </a:r>
+            <a:r>
+              <a:rPr lang="en-GB" sz="3600" b="1">
+                <a:solidFill>
+                  <a:schemeClr val="accent2"/>
+                </a:solidFill>
+              </a:rPr>
+              <a:t>each phase</a:t>
+            </a:r>
+            <a:r>
+              <a:rPr lang="en-GB" sz="3600" b="1">
+                <a:solidFill>
+                  <a:schemeClr val="accent1"/>
+                </a:solidFill>
+              </a:rPr>
+              <a:t> of the design and product development process</a:t>
+            </a:r>
+          </a:p>
+        </p:txBody>
+      </p:sp>
+    </p:spTree>
+    <p:extLst>
+      <p:ext uri="{BB962C8B-B14F-4D97-AF65-F5344CB8AC3E}">
+        <p14:creationId xmlns:p14="http://schemas.microsoft.com/office/powerpoint/2010/main" val="528717180"/>
+      </p:ext>
+    </p:extLst>
+  </p:cSld>
+  <p:clrMapOvr>
+    <a:masterClrMapping/>
+  </p:clrMapOvr>
+</p:sld>
+</file>
+
+<file path=ppt/slides/slide6.xml><?xml version="1.0" encoding="utf-8"?>
+<p:sld xmlns:a="http://schemas.openxmlformats.org/drawingml/2006/main" xmlns:r="http://schemas.openxmlformats.org/officeDocument/2006/relationships" xmlns:p="http://schemas.openxmlformats.org/presentationml/2006/main">
+  <p:cSld>
+    <p:spTree>
+      <p:nvGrpSpPr>
+        <p:cNvPr id="1" name=""/>
+        <p:cNvGrpSpPr/>
+        <p:nvPr/>
+      </p:nvGrpSpPr>
+      <p:grpSpPr>
+        <a:xfrm>
+          <a:off x="0" y="0"/>
+          <a:ext cx="0" cy="0"/>
+          <a:chOff x="0" y="0"/>
+          <a:chExt cx="0" cy="0"/>
+        </a:xfrm>
+      </p:grpSpPr>
+      <p:sp>
+        <p:nvSpPr>
           <p:cNvPr id="2" name="Title 1">
             <a:extLst>
               <a:ext uri="{FF2B5EF4-FFF2-40B4-BE49-F238E27FC236}">
@@ -7444,7 +7837,7 @@
             <a:fld id="{8F91DE98-5B9A-4C57-AF25-752D64D42599}" type="slidenum">
               <a:rPr lang="en-GB" smtClean="0"/>
               <a:pPr/>
-              <a:t>5</a:t>
+              <a:t>6</a:t>
             </a:fld>
             <a:endParaRPr lang="en-GB"/>
           </a:p>
@@ -8235,71 +8628,6 @@
 </p:sld>
 </file>
 
-<file path=ppt/slides/slide6.xml><?xml version="1.0" encoding="utf-8"?>
-<p:sld xmlns:a="http://schemas.openxmlformats.org/drawingml/2006/main" xmlns:r="http://schemas.openxmlformats.org/officeDocument/2006/relationships" xmlns:p="http://schemas.openxmlformats.org/presentationml/2006/main">
-  <p:cSld>
-    <p:spTree>
-      <p:nvGrpSpPr>
-        <p:cNvPr id="1" name=""/>
-        <p:cNvGrpSpPr/>
-        <p:nvPr/>
-      </p:nvGrpSpPr>
-      <p:grpSpPr>
-        <a:xfrm>
-          <a:off x="0" y="0"/>
-          <a:ext cx="0" cy="0"/>
-          <a:chOff x="0" y="0"/>
-          <a:chExt cx="0" cy="0"/>
-        </a:xfrm>
-      </p:grpSpPr>
-      <p:sp>
-        <p:nvSpPr>
-          <p:cNvPr id="3" name="Text Placeholder 2">
-            <a:extLst>
-              <a:ext uri="{FF2B5EF4-FFF2-40B4-BE49-F238E27FC236}">
-                <a16:creationId xmlns:a16="http://schemas.microsoft.com/office/drawing/2014/main" id="{242ED0DE-7728-E0D3-C63B-7CD6A8D42BAF}"/>
-              </a:ext>
-            </a:extLst>
-          </p:cNvPr>
-          <p:cNvSpPr>
-            <a:spLocks noGrp="1"/>
-          </p:cNvSpPr>
-          <p:nvPr>
-            <p:ph type="body" sz="quarter" idx="23"/>
-          </p:nvPr>
-        </p:nvSpPr>
-        <p:spPr/>
-        <p:txBody>
-          <a:bodyPr>
-            <a:normAutofit fontScale="92500" lnSpcReduction="10000"/>
-          </a:bodyPr>
-          <a:lstStyle/>
-          <a:p>
-            <a:r>
-              <a:rPr lang="nl-NL" sz="4400">
-                <a:latin typeface="Arial"/>
-                <a:cs typeface="Arial"/>
-                <a:sym typeface="Wingdings" pitchFamily="2" charset="2"/>
-              </a:rPr>
-              <a:t>Strong UX Design &amp; UX Research is key to materialize our Strategy</a:t>
-            </a:r>
-            <a:endParaRPr lang="en-NL"/>
-          </a:p>
-        </p:txBody>
-      </p:sp>
-    </p:spTree>
-    <p:extLst>
-      <p:ext uri="{BB962C8B-B14F-4D97-AF65-F5344CB8AC3E}">
-        <p14:creationId xmlns:p14="http://schemas.microsoft.com/office/powerpoint/2010/main" val="305811184"/>
-      </p:ext>
-    </p:extLst>
-  </p:cSld>
-  <p:clrMapOvr>
-    <a:masterClrMapping/>
-  </p:clrMapOvr>
-</p:sld>
-</file>
-
 <file path=ppt/slides/slide7.xml><?xml version="1.0" encoding="utf-8"?>
 <p:sld xmlns:a="http://schemas.openxmlformats.org/drawingml/2006/main" xmlns:r="http://schemas.openxmlformats.org/officeDocument/2006/relationships" xmlns:p="http://schemas.openxmlformats.org/presentationml/2006/main">
   <p:cSld>
@@ -8319,6 +8647,71 @@
       </p:grpSpPr>
       <p:sp>
         <p:nvSpPr>
+          <p:cNvPr id="3" name="Text Placeholder 2">
+            <a:extLst>
+              <a:ext uri="{FF2B5EF4-FFF2-40B4-BE49-F238E27FC236}">
+                <a16:creationId xmlns:a16="http://schemas.microsoft.com/office/drawing/2014/main" id="{242ED0DE-7728-E0D3-C63B-7CD6A8D42BAF}"/>
+              </a:ext>
+            </a:extLst>
+          </p:cNvPr>
+          <p:cNvSpPr>
+            <a:spLocks noGrp="1"/>
+          </p:cNvSpPr>
+          <p:nvPr>
+            <p:ph type="body" sz="quarter" idx="23"/>
+          </p:nvPr>
+        </p:nvSpPr>
+        <p:spPr/>
+        <p:txBody>
+          <a:bodyPr>
+            <a:normAutofit fontScale="92500" lnSpcReduction="10000"/>
+          </a:bodyPr>
+          <a:lstStyle/>
+          <a:p>
+            <a:r>
+              <a:rPr lang="nl-NL" sz="4400">
+                <a:latin typeface="Arial"/>
+                <a:cs typeface="Arial"/>
+                <a:sym typeface="Wingdings" pitchFamily="2" charset="2"/>
+              </a:rPr>
+              <a:t>Strong UX Design &amp; UX Research is key to materialize our Strategy</a:t>
+            </a:r>
+            <a:endParaRPr lang="en-NL"/>
+          </a:p>
+        </p:txBody>
+      </p:sp>
+    </p:spTree>
+    <p:extLst>
+      <p:ext uri="{BB962C8B-B14F-4D97-AF65-F5344CB8AC3E}">
+        <p14:creationId xmlns:p14="http://schemas.microsoft.com/office/powerpoint/2010/main" val="305811184"/>
+      </p:ext>
+    </p:extLst>
+  </p:cSld>
+  <p:clrMapOvr>
+    <a:masterClrMapping/>
+  </p:clrMapOvr>
+</p:sld>
+</file>
+
+<file path=ppt/slides/slide8.xml><?xml version="1.0" encoding="utf-8"?>
+<p:sld xmlns:a="http://schemas.openxmlformats.org/drawingml/2006/main" xmlns:r="http://schemas.openxmlformats.org/officeDocument/2006/relationships" xmlns:p="http://schemas.openxmlformats.org/presentationml/2006/main">
+  <p:cSld>
+    <p:spTree>
+      <p:nvGrpSpPr>
+        <p:cNvPr id="1" name=""/>
+        <p:cNvGrpSpPr/>
+        <p:nvPr/>
+      </p:nvGrpSpPr>
+      <p:grpSpPr>
+        <a:xfrm>
+          <a:off x="0" y="0"/>
+          <a:ext cx="0" cy="0"/>
+          <a:chOff x="0" y="0"/>
+          <a:chExt cx="0" cy="0"/>
+        </a:xfrm>
+      </p:grpSpPr>
+      <p:sp>
+        <p:nvSpPr>
           <p:cNvPr id="2" name="Title 1">
             <a:extLst>
               <a:ext uri="{FF2B5EF4-FFF2-40B4-BE49-F238E27FC236}">
@@ -8401,7 +8794,7 @@
             <a:fld id="{8F91DE98-5B9A-4C57-AF25-752D64D42599}" type="slidenum">
               <a:rPr lang="en-GB" smtClean="0"/>
               <a:pPr/>
-              <a:t>7</a:t>
+              <a:t>8</a:t>
             </a:fld>
             <a:endParaRPr lang="en-GB"/>
           </a:p>
@@ -8522,7 +8915,7 @@
 </p:sld>
 </file>
 
-<file path=ppt/slides/slide8.xml><?xml version="1.0" encoding="utf-8"?>
+<file path=ppt/slides/slide9.xml><?xml version="1.0" encoding="utf-8"?>
 <p:sld xmlns:a="http://schemas.openxmlformats.org/drawingml/2006/main" xmlns:r="http://schemas.openxmlformats.org/officeDocument/2006/relationships" xmlns:p="http://schemas.openxmlformats.org/presentationml/2006/main">
   <p:cSld>
     <p:spTree>

</xml_diff>